<commit_message>
Update ParkingArea Project's Documents
</commit_message>
<xml_diff>
--- a/SimpleProjects/Module/ParkingArea/1.Design/Database/Database_ERDiagram.pptx
+++ b/SimpleProjects/Module/ParkingArea/1.Design/Database/Database_ERDiagram.pptx
@@ -305,7 +305,7 @@
           <a:p>
             <a:fld id="{E90ED720-0104-4369-84BC-D37694168613}" type="datetimeFigureOut">
               <a:rPr kumimoji="1" lang="ja-JP" altLang="en-US" smtClean="0"/>
-              <a:t>2020/5/4</a:t>
+              <a:t>2020/5/5</a:t>
             </a:fld>
             <a:endParaRPr kumimoji="1" lang="ja-JP" altLang="en-US"/>
           </a:p>
@@ -502,7 +502,7 @@
           <a:p>
             <a:fld id="{E90ED720-0104-4369-84BC-D37694168613}" type="datetimeFigureOut">
               <a:rPr kumimoji="1" lang="ja-JP" altLang="en-US" smtClean="0"/>
-              <a:t>2020/5/4</a:t>
+              <a:t>2020/5/5</a:t>
             </a:fld>
             <a:endParaRPr kumimoji="1" lang="ja-JP" altLang="en-US"/>
           </a:p>
@@ -709,7 +709,7 @@
           <a:p>
             <a:fld id="{E90ED720-0104-4369-84BC-D37694168613}" type="datetimeFigureOut">
               <a:rPr kumimoji="1" lang="ja-JP" altLang="en-US" smtClean="0"/>
-              <a:t>2020/5/4</a:t>
+              <a:t>2020/5/5</a:t>
             </a:fld>
             <a:endParaRPr kumimoji="1" lang="ja-JP" altLang="en-US"/>
           </a:p>
@@ -906,7 +906,7 @@
           <a:p>
             <a:fld id="{E90ED720-0104-4369-84BC-D37694168613}" type="datetimeFigureOut">
               <a:rPr kumimoji="1" lang="ja-JP" altLang="en-US" smtClean="0"/>
-              <a:t>2020/5/4</a:t>
+              <a:t>2020/5/5</a:t>
             </a:fld>
             <a:endParaRPr kumimoji="1" lang="ja-JP" altLang="en-US"/>
           </a:p>
@@ -1147,7 +1147,7 @@
           <a:p>
             <a:fld id="{E90ED720-0104-4369-84BC-D37694168613}" type="datetimeFigureOut">
               <a:rPr kumimoji="1" lang="ja-JP" altLang="en-US" smtClean="0"/>
-              <a:t>2020/5/4</a:t>
+              <a:t>2020/5/5</a:t>
             </a:fld>
             <a:endParaRPr kumimoji="1" lang="ja-JP" altLang="en-US"/>
           </a:p>
@@ -1494,7 +1494,7 @@
           <a:p>
             <a:fld id="{E90ED720-0104-4369-84BC-D37694168613}" type="datetimeFigureOut">
               <a:rPr kumimoji="1" lang="ja-JP" altLang="en-US" smtClean="0"/>
-              <a:t>2020/5/4</a:t>
+              <a:t>2020/5/5</a:t>
             </a:fld>
             <a:endParaRPr kumimoji="1" lang="ja-JP" altLang="en-US"/>
           </a:p>
@@ -1975,7 +1975,7 @@
           <a:p>
             <a:fld id="{E90ED720-0104-4369-84BC-D37694168613}" type="datetimeFigureOut">
               <a:rPr kumimoji="1" lang="ja-JP" altLang="en-US" smtClean="0"/>
-              <a:t>2020/5/4</a:t>
+              <a:t>2020/5/5</a:t>
             </a:fld>
             <a:endParaRPr kumimoji="1" lang="ja-JP" altLang="en-US"/>
           </a:p>
@@ -2088,7 +2088,7 @@
           <a:p>
             <a:fld id="{E90ED720-0104-4369-84BC-D37694168613}" type="datetimeFigureOut">
               <a:rPr kumimoji="1" lang="ja-JP" altLang="en-US" smtClean="0"/>
-              <a:t>2020/5/4</a:t>
+              <a:t>2020/5/5</a:t>
             </a:fld>
             <a:endParaRPr kumimoji="1" lang="ja-JP" altLang="en-US"/>
           </a:p>
@@ -2178,7 +2178,7 @@
           <a:p>
             <a:fld id="{E90ED720-0104-4369-84BC-D37694168613}" type="datetimeFigureOut">
               <a:rPr kumimoji="1" lang="ja-JP" altLang="en-US" smtClean="0"/>
-              <a:t>2020/5/4</a:t>
+              <a:t>2020/5/5</a:t>
             </a:fld>
             <a:endParaRPr kumimoji="1" lang="ja-JP" altLang="en-US"/>
           </a:p>
@@ -2482,7 +2482,7 @@
           <a:p>
             <a:fld id="{E90ED720-0104-4369-84BC-D37694168613}" type="datetimeFigureOut">
               <a:rPr kumimoji="1" lang="ja-JP" altLang="en-US" smtClean="0"/>
-              <a:t>2020/5/4</a:t>
+              <a:t>2020/5/5</a:t>
             </a:fld>
             <a:endParaRPr kumimoji="1" lang="ja-JP" altLang="en-US"/>
           </a:p>
@@ -2730,7 +2730,7 @@
           <a:p>
             <a:fld id="{E90ED720-0104-4369-84BC-D37694168613}" type="datetimeFigureOut">
               <a:rPr kumimoji="1" lang="ja-JP" altLang="en-US" smtClean="0"/>
-              <a:t>2020/5/4</a:t>
+              <a:t>2020/5/5</a:t>
             </a:fld>
             <a:endParaRPr kumimoji="1" lang="ja-JP" altLang="en-US"/>
           </a:p>
@@ -2970,7 +2970,7 @@
           <a:p>
             <a:fld id="{E90ED720-0104-4369-84BC-D37694168613}" type="datetimeFigureOut">
               <a:rPr kumimoji="1" lang="ja-JP" altLang="en-US" smtClean="0"/>
-              <a:t>2020/5/4</a:t>
+              <a:t>2020/5/5</a:t>
             </a:fld>
             <a:endParaRPr kumimoji="1" lang="ja-JP" altLang="en-US"/>
           </a:p>
@@ -3349,7 +3349,7 @@
           <p:nvPr>
             <p:extLst>
               <p:ext uri="{D42A27DB-BD31-4B8C-83A1-F6EECF244321}">
-                <p14:modId xmlns:p14="http://schemas.microsoft.com/office/powerpoint/2010/main" val="1340351276"/>
+                <p14:modId xmlns:p14="http://schemas.microsoft.com/office/powerpoint/2010/main" val="3972229413"/>
               </p:ext>
             </p:extLst>
           </p:nvPr>
@@ -3365,14 +3365,14 @@
                 <a:tableStyleId>{F2DE63D5-997A-4646-A377-4702673A728D}</a:tableStyleId>
               </a:tblPr>
               <a:tblGrid>
-                <a:gridCol w="2032000">
+                <a:gridCol w="2331165">
                   <a:extLst>
                     <a:ext uri="{9D8B030D-6E8A-4147-A177-3AD203B41FA5}">
                       <a16:colId xmlns:a16="http://schemas.microsoft.com/office/drawing/2014/main" val="20000"/>
                     </a:ext>
                   </a:extLst>
                 </a:gridCol>
-                <a:gridCol w="1016000">
+                <a:gridCol w="716835">
                   <a:extLst>
                     <a:ext uri="{9D8B030D-6E8A-4147-A177-3AD203B41FA5}">
                       <a16:colId xmlns:a16="http://schemas.microsoft.com/office/drawing/2014/main" val="20001"/>
@@ -3441,8 +3441,8 @@
                     <a:p>
                       <a:pPr algn="ctr" latinLnBrk="1"/>
                       <a:r>
-                        <a:rPr lang="en-US" altLang="ko-KR" dirty="0" err="1" smtClean="0"/>
-                        <a:t>User_information</a:t>
+                        <a:rPr lang="en-US" altLang="ko-KR" dirty="0" smtClean="0"/>
+                        <a:t>T_LOT_INFORMATION</a:t>
                       </a:r>
                       <a:endParaRPr lang="ko-KR" altLang="en-US" dirty="0"/>
                     </a:p>
@@ -3488,11 +3488,7 @@
                       <a:pPr algn="ctr" latinLnBrk="1"/>
                       <a:r>
                         <a:rPr lang="en-US" altLang="ko-KR" baseline="0" dirty="0" smtClean="0"/>
-                        <a:t>Column </a:t>
-                      </a:r>
-                      <a:r>
-                        <a:rPr lang="en-US" altLang="ko-KR" baseline="0" dirty="0" smtClean="0"/>
-                        <a:t>Name</a:t>
+                        <a:t>Column Name</a:t>
                       </a:r>
                       <a:endParaRPr lang="ko-KR" altLang="en-US" dirty="0"/>
                     </a:p>
@@ -3628,7 +3624,7 @@
                       <a:pPr algn="ctr" latinLnBrk="1"/>
                       <a:r>
                         <a:rPr lang="en-US" altLang="ko-KR" dirty="0" smtClean="0"/>
-                        <a:t>Email</a:t>
+                        <a:t>LOT_NUMBER</a:t>
                       </a:r>
                       <a:endParaRPr lang="ko-KR" altLang="en-US" dirty="0"/>
                     </a:p>
@@ -3656,7 +3652,7 @@
                       <a:pPr algn="ctr" latinLnBrk="1"/>
                       <a:r>
                         <a:rPr lang="en-US" altLang="ko-KR" dirty="0" smtClean="0"/>
-                        <a:t>Varchar2(60)</a:t>
+                        <a:t>VARCHAR(20)</a:t>
                       </a:r>
                       <a:endParaRPr lang="ko-KR" altLang="en-US" dirty="0"/>
                     </a:p>
@@ -3741,7 +3737,7 @@
                       <a:pPr algn="ctr" latinLnBrk="1"/>
                       <a:r>
                         <a:rPr lang="en-US" altLang="ko-KR" dirty="0" smtClean="0"/>
-                        <a:t>Password</a:t>
+                        <a:t>LOT_NAME</a:t>
                       </a:r>
                       <a:endParaRPr lang="ko-KR" altLang="en-US" dirty="0"/>
                     </a:p>
@@ -3769,7 +3765,7 @@
                       <a:pPr algn="ctr" latinLnBrk="1"/>
                       <a:r>
                         <a:rPr lang="en-US" altLang="ko-KR" dirty="0" smtClean="0"/>
-                        <a:t>Varchar2(100)</a:t>
+                        <a:t>VARCHAR(10)</a:t>
                       </a:r>
                       <a:endParaRPr lang="ko-KR" altLang="en-US" dirty="0"/>
                     </a:p>
@@ -3820,7 +3816,11 @@
                       <a:pPr algn="ctr" latinLnBrk="1"/>
                       <a:r>
                         <a:rPr lang="en-US" altLang="ko-KR" dirty="0" smtClean="0"/>
-                        <a:t>Not null</a:t>
+                        <a:t>NOT</a:t>
+                      </a:r>
+                      <a:r>
+                        <a:rPr lang="en-US" altLang="ko-KR" baseline="0" dirty="0" smtClean="0"/>
+                        <a:t> NULL</a:t>
                       </a:r>
                       <a:endParaRPr lang="ko-KR" altLang="en-US" dirty="0"/>
                     </a:p>
@@ -3854,138 +3854,8 @@
                     <a:p>
                       <a:pPr algn="ctr" latinLnBrk="1"/>
                       <a:r>
-                        <a:rPr lang="en-US" altLang="ko-KR" dirty="0" err="1" smtClean="0"/>
-                        <a:t>Nick_name</a:t>
-                      </a:r>
-                      <a:endParaRPr lang="ko-KR" altLang="en-US" dirty="0"/>
-                    </a:p>
-                  </a:txBody>
-                  <a:tcPr>
-                    <a:lnR w="12700" cap="flat" cmpd="sng" algn="ctr">
-                      <a:solidFill>
-                        <a:schemeClr val="accent3">
-                          <a:lumMod val="60000"/>
-                          <a:lumOff val="40000"/>
-                        </a:schemeClr>
-                      </a:solidFill>
-                      <a:prstDash val="solid"/>
-                      <a:round/>
-                      <a:headEnd type="none" w="med" len="med"/>
-                      <a:tailEnd type="none" w="med" len="med"/>
-                    </a:lnR>
-                  </a:tcPr>
-                </a:tc>
-                <a:tc gridSpan="2">
-                  <a:txBody>
-                    <a:bodyPr/>
-                    <a:lstStyle/>
-                    <a:p>
-                      <a:pPr algn="ctr" latinLnBrk="1"/>
-                      <a:r>
                         <a:rPr lang="en-US" altLang="ko-KR" dirty="0" smtClean="0"/>
-                        <a:t>Varchar2(50)</a:t>
-                      </a:r>
-                      <a:endParaRPr lang="ko-KR" altLang="en-US" dirty="0"/>
-                    </a:p>
-                  </a:txBody>
-                  <a:tcPr>
-                    <a:lnL w="12700" cap="flat" cmpd="sng" algn="ctr">
-                      <a:solidFill>
-                        <a:schemeClr val="accent3">
-                          <a:lumMod val="60000"/>
-                          <a:lumOff val="40000"/>
-                        </a:schemeClr>
-                      </a:solidFill>
-                      <a:prstDash val="solid"/>
-                      <a:round/>
-                      <a:headEnd type="none" w="med" len="med"/>
-                      <a:tailEnd type="none" w="med" len="med"/>
-                    </a:lnL>
-                    <a:lnR w="12700" cap="flat" cmpd="sng" algn="ctr">
-                      <a:solidFill>
-                        <a:schemeClr val="accent3">
-                          <a:lumMod val="60000"/>
-                          <a:lumOff val="40000"/>
-                        </a:schemeClr>
-                      </a:solidFill>
-                      <a:prstDash val="solid"/>
-                      <a:round/>
-                      <a:headEnd type="none" w="med" len="med"/>
-                      <a:tailEnd type="none" w="med" len="med"/>
-                    </a:lnR>
-                  </a:tcPr>
-                </a:tc>
-                <a:tc hMerge="1">
-                  <a:txBody>
-                    <a:bodyPr/>
-                    <a:lstStyle/>
-                    <a:p>
-                      <a:pPr latinLnBrk="1"/>
-                      <a:endParaRPr lang="ko-KR" altLang="en-US"/>
-                    </a:p>
-                  </a:txBody>
-                  <a:tcPr/>
-                </a:tc>
-                <a:tc>
-                  <a:txBody>
-                    <a:bodyPr/>
-                    <a:lstStyle/>
-                    <a:p>
-                      <a:pPr marL="0" marR="0" indent="0" algn="ctr" defTabSz="914400" rtl="0" eaLnBrk="1" fontAlgn="auto" latinLnBrk="1" hangingPunct="1">
-                        <a:lnSpc>
-                          <a:spcPct val="100000"/>
-                        </a:lnSpc>
-                        <a:spcBef>
-                          <a:spcPts val="0"/>
-                        </a:spcBef>
-                        <a:spcAft>
-                          <a:spcPts val="0"/>
-                        </a:spcAft>
-                        <a:buClrTx/>
-                        <a:buSzTx/>
-                        <a:buFontTx/>
-                        <a:buNone/>
-                        <a:tabLst/>
-                        <a:defRPr/>
-                      </a:pPr>
-                      <a:r>
-                        <a:rPr lang="en-US" altLang="ko-KR" dirty="0" smtClean="0"/>
-                        <a:t>Not null</a:t>
-                      </a:r>
-                      <a:endParaRPr lang="ko-KR" altLang="en-US" dirty="0" smtClean="0"/>
-                    </a:p>
-                  </a:txBody>
-                  <a:tcPr>
-                    <a:lnL w="12700" cap="flat" cmpd="sng" algn="ctr">
-                      <a:solidFill>
-                        <a:schemeClr val="accent3">
-                          <a:lumMod val="60000"/>
-                          <a:lumOff val="40000"/>
-                        </a:schemeClr>
-                      </a:solidFill>
-                      <a:prstDash val="solid"/>
-                      <a:round/>
-                      <a:headEnd type="none" w="med" len="med"/>
-                      <a:tailEnd type="none" w="med" len="med"/>
-                    </a:lnL>
-                  </a:tcPr>
-                </a:tc>
-                <a:extLst>
-                  <a:ext uri="{0D108BD9-81ED-4DB2-BD59-A6C34878D82A}">
-                    <a16:rowId xmlns:a16="http://schemas.microsoft.com/office/drawing/2014/main" val="10004"/>
-                  </a:ext>
-                </a:extLst>
-              </a:tr>
-              <a:tr h="370840">
-                <a:tc>
-                  <a:txBody>
-                    <a:bodyPr/>
-                    <a:lstStyle/>
-                    <a:p>
-                      <a:pPr algn="ctr" latinLnBrk="1"/>
-                      <a:r>
-                        <a:rPr lang="en-US" altLang="ko-KR" dirty="0" smtClean="0"/>
-                        <a:t>Phone</a:t>
+                        <a:t>ACCEPTABLE_SMALL</a:t>
                       </a:r>
                       <a:endParaRPr lang="ko-KR" altLang="en-US" dirty="0"/>
                     </a:p>
@@ -4029,7 +3899,7 @@
                       </a:pPr>
                       <a:r>
                         <a:rPr lang="en-US" altLang="ko-KR" dirty="0" smtClean="0"/>
-                        <a:t>Char(20)</a:t>
+                        <a:t>NUMBER(100)</a:t>
                       </a:r>
                       <a:endParaRPr lang="ko-KR" altLang="en-US" dirty="0" smtClean="0"/>
                     </a:p>
@@ -4077,28 +3947,16 @@
                     <a:bodyPr/>
                     <a:lstStyle/>
                     <a:p>
-                      <a:pPr marL="0" marR="0" indent="0" algn="ctr" defTabSz="914400" rtl="0" eaLnBrk="1" fontAlgn="auto" latinLnBrk="1" hangingPunct="1">
-                        <a:lnSpc>
-                          <a:spcPct val="100000"/>
-                        </a:lnSpc>
-                        <a:spcBef>
-                          <a:spcPts val="0"/>
-                        </a:spcBef>
-                        <a:spcAft>
-                          <a:spcPts val="0"/>
-                        </a:spcAft>
-                        <a:buClrTx/>
-                        <a:buSzTx/>
-                        <a:buFontTx/>
-                        <a:buNone/>
-                        <a:tabLst/>
-                        <a:defRPr/>
-                      </a:pPr>
+                      <a:pPr algn="ctr" latinLnBrk="1"/>
                       <a:r>
                         <a:rPr lang="en-US" altLang="ko-KR" dirty="0" smtClean="0"/>
-                        <a:t>Not null</a:t>
+                        <a:t>NOT</a:t>
                       </a:r>
-                      <a:endParaRPr lang="ko-KR" altLang="en-US" dirty="0" smtClean="0"/>
+                      <a:r>
+                        <a:rPr lang="en-US" altLang="ko-KR" baseline="0" dirty="0" smtClean="0"/>
+                        <a:t> NULL</a:t>
+                      </a:r>
+                      <a:endParaRPr lang="ko-KR" altLang="en-US" dirty="0"/>
                     </a:p>
                   </a:txBody>
                   <a:tcPr>
@@ -4118,11 +3976,11 @@
                 </a:tc>
                 <a:extLst>
                   <a:ext uri="{0D108BD9-81ED-4DB2-BD59-A6C34878D82A}">
-                    <a16:rowId xmlns:a16="http://schemas.microsoft.com/office/drawing/2014/main" val="10005"/>
+                    <a16:rowId xmlns:a16="http://schemas.microsoft.com/office/drawing/2014/main" val="10004"/>
                   </a:ext>
                 </a:extLst>
               </a:tr>
-              <a:tr h="368508">
+              <a:tr h="370840">
                 <a:tc>
                   <a:txBody>
                     <a:bodyPr/>
@@ -4131,7 +3989,7 @@
                       <a:pPr algn="ctr" latinLnBrk="1"/>
                       <a:r>
                         <a:rPr lang="en-US" altLang="ko-KR" dirty="0" smtClean="0"/>
-                        <a:t>Grade</a:t>
+                        <a:t>ACCEPTABLE_MEDIUM</a:t>
                       </a:r>
                       <a:endParaRPr lang="ko-KR" altLang="en-US" dirty="0"/>
                     </a:p>
@@ -4175,7 +4033,7 @@
                       </a:pPr>
                       <a:r>
                         <a:rPr lang="en-US" altLang="ko-KR" dirty="0" smtClean="0"/>
-                        <a:t>Number(3)</a:t>
+                        <a:t>NUMBER(100)</a:t>
                       </a:r>
                       <a:endParaRPr lang="ko-KR" altLang="en-US" dirty="0" smtClean="0"/>
                     </a:p>
@@ -4223,6 +4081,73 @@
                     <a:bodyPr/>
                     <a:lstStyle/>
                     <a:p>
+                      <a:pPr algn="ctr" latinLnBrk="1"/>
+                      <a:r>
+                        <a:rPr lang="en-US" altLang="ko-KR" dirty="0" smtClean="0"/>
+                        <a:t>NOT</a:t>
+                      </a:r>
+                      <a:r>
+                        <a:rPr lang="en-US" altLang="ko-KR" baseline="0" dirty="0" smtClean="0"/>
+                        <a:t> NULL</a:t>
+                      </a:r>
+                      <a:endParaRPr lang="ko-KR" altLang="en-US" dirty="0"/>
+                    </a:p>
+                  </a:txBody>
+                  <a:tcPr>
+                    <a:lnL w="12700" cap="flat" cmpd="sng" algn="ctr">
+                      <a:solidFill>
+                        <a:schemeClr val="accent3">
+                          <a:lumMod val="60000"/>
+                          <a:lumOff val="40000"/>
+                        </a:schemeClr>
+                      </a:solidFill>
+                      <a:prstDash val="solid"/>
+                      <a:round/>
+                      <a:headEnd type="none" w="med" len="med"/>
+                      <a:tailEnd type="none" w="med" len="med"/>
+                    </a:lnL>
+                  </a:tcPr>
+                </a:tc>
+                <a:extLst>
+                  <a:ext uri="{0D108BD9-81ED-4DB2-BD59-A6C34878D82A}">
+                    <a16:rowId xmlns:a16="http://schemas.microsoft.com/office/drawing/2014/main" val="10005"/>
+                  </a:ext>
+                </a:extLst>
+              </a:tr>
+              <a:tr h="368508">
+                <a:tc>
+                  <a:txBody>
+                    <a:bodyPr/>
+                    <a:lstStyle/>
+                    <a:p>
+                      <a:pPr algn="ctr" latinLnBrk="1"/>
+                      <a:r>
+                        <a:rPr lang="en-US" altLang="ko-KR" dirty="0" smtClean="0"/>
+                        <a:t>ACCEPTABLE_HEAVY</a:t>
+                      </a:r>
+                      <a:endParaRPr lang="ko-KR" altLang="en-US" dirty="0"/>
+                    </a:p>
+                  </a:txBody>
+                  <a:tcPr>
+                    <a:lnR w="12700" cap="flat" cmpd="sng" algn="ctr">
+                      <a:solidFill>
+                        <a:schemeClr val="accent3">
+                          <a:lumMod val="60000"/>
+                          <a:lumOff val="40000"/>
+                        </a:schemeClr>
+                      </a:solidFill>
+                      <a:prstDash val="solid"/>
+                      <a:round/>
+                      <a:headEnd type="none" w="med" len="med"/>
+                      <a:tailEnd type="none" w="med" len="med"/>
+                    </a:lnR>
+                  </a:tcPr>
+                </a:tc>
+                <a:tc gridSpan="2">
+                  <a:txBody>
+                    <a:bodyPr/>
+                    <a:lstStyle/>
+                    <a:p>
                       <a:pPr marL="0" marR="0" indent="0" algn="ctr" defTabSz="914400" rtl="0" eaLnBrk="1" fontAlgn="auto" latinLnBrk="1" hangingPunct="1">
                         <a:lnSpc>
                           <a:spcPct val="100000"/>
@@ -4242,9 +4167,64 @@
                       </a:pPr>
                       <a:r>
                         <a:rPr lang="en-US" altLang="ko-KR" dirty="0" smtClean="0"/>
-                        <a:t>Not null</a:t>
+                        <a:t>NUMBER(100)</a:t>
                       </a:r>
                       <a:endParaRPr lang="ko-KR" altLang="en-US" dirty="0" smtClean="0"/>
+                    </a:p>
+                  </a:txBody>
+                  <a:tcPr>
+                    <a:lnL w="12700" cap="flat" cmpd="sng" algn="ctr">
+                      <a:solidFill>
+                        <a:schemeClr val="accent3">
+                          <a:lumMod val="60000"/>
+                          <a:lumOff val="40000"/>
+                        </a:schemeClr>
+                      </a:solidFill>
+                      <a:prstDash val="solid"/>
+                      <a:round/>
+                      <a:headEnd type="none" w="med" len="med"/>
+                      <a:tailEnd type="none" w="med" len="med"/>
+                    </a:lnL>
+                    <a:lnR w="12700" cap="flat" cmpd="sng" algn="ctr">
+                      <a:solidFill>
+                        <a:schemeClr val="accent3">
+                          <a:lumMod val="60000"/>
+                          <a:lumOff val="40000"/>
+                        </a:schemeClr>
+                      </a:solidFill>
+                      <a:prstDash val="solid"/>
+                      <a:round/>
+                      <a:headEnd type="none" w="med" len="med"/>
+                      <a:tailEnd type="none" w="med" len="med"/>
+                    </a:lnR>
+                  </a:tcPr>
+                </a:tc>
+                <a:tc hMerge="1">
+                  <a:txBody>
+                    <a:bodyPr/>
+                    <a:lstStyle/>
+                    <a:p>
+                      <a:pPr latinLnBrk="1"/>
+                      <a:endParaRPr lang="ko-KR" altLang="en-US"/>
+                    </a:p>
+                  </a:txBody>
+                  <a:tcPr/>
+                </a:tc>
+                <a:tc>
+                  <a:txBody>
+                    <a:bodyPr/>
+                    <a:lstStyle/>
+                    <a:p>
+                      <a:pPr algn="ctr" latinLnBrk="1"/>
+                      <a:r>
+                        <a:rPr lang="en-US" altLang="ko-KR" dirty="0" smtClean="0"/>
+                        <a:t>NOT</a:t>
+                      </a:r>
+                      <a:r>
+                        <a:rPr lang="en-US" altLang="ko-KR" baseline="0" dirty="0" smtClean="0"/>
+                        <a:t> NULL</a:t>
+                      </a:r>
+                      <a:endParaRPr lang="ko-KR" altLang="en-US" dirty="0"/>
                     </a:p>
                   </a:txBody>
                   <a:tcPr>
@@ -4276,8 +4256,8 @@
                     <a:p>
                       <a:pPr algn="ctr" latinLnBrk="1"/>
                       <a:r>
-                        <a:rPr lang="en-US" altLang="ko-KR" dirty="0" err="1" smtClean="0"/>
-                        <a:t>Del_flg</a:t>
+                        <a:rPr lang="en-US" altLang="ko-KR" dirty="0" smtClean="0"/>
+                        <a:t>DEL_FLG</a:t>
                       </a:r>
                       <a:endParaRPr lang="ko-KR" altLang="en-US" dirty="0"/>
                     </a:p>
@@ -4369,28 +4349,16 @@
                     <a:bodyPr/>
                     <a:lstStyle/>
                     <a:p>
-                      <a:pPr marL="0" marR="0" indent="0" algn="ctr" defTabSz="914400" rtl="0" eaLnBrk="1" fontAlgn="auto" latinLnBrk="1" hangingPunct="1">
-                        <a:lnSpc>
-                          <a:spcPct val="100000"/>
-                        </a:lnSpc>
-                        <a:spcBef>
-                          <a:spcPts val="0"/>
-                        </a:spcBef>
-                        <a:spcAft>
-                          <a:spcPts val="0"/>
-                        </a:spcAft>
-                        <a:buClrTx/>
-                        <a:buSzTx/>
-                        <a:buFontTx/>
-                        <a:buNone/>
-                        <a:tabLst/>
-                        <a:defRPr/>
-                      </a:pPr>
+                      <a:pPr algn="ctr" latinLnBrk="1"/>
                       <a:r>
                         <a:rPr lang="en-US" altLang="ko-KR" dirty="0" smtClean="0"/>
-                        <a:t>Not  null</a:t>
+                        <a:t>NOT</a:t>
                       </a:r>
-                      <a:endParaRPr lang="ko-KR" altLang="en-US" dirty="0" smtClean="0"/>
+                      <a:r>
+                        <a:rPr lang="en-US" altLang="ko-KR" baseline="0" dirty="0" smtClean="0"/>
+                        <a:t> NULL</a:t>
+                      </a:r>
+                      <a:endParaRPr lang="ko-KR" altLang="en-US" dirty="0"/>
                     </a:p>
                   </a:txBody>
                   <a:tcPr>
@@ -5186,7 +5154,7 @@
         </p:nvGrpSpPr>
         <p:grpSpPr>
           <a:xfrm>
-            <a:off x="2771800" y="4118570"/>
+            <a:off x="8460432" y="2814512"/>
             <a:ext cx="212865" cy="898761"/>
             <a:chOff x="2845503" y="2934440"/>
             <a:chExt cx="212865" cy="898761"/>
@@ -5536,6 +5504,1234 @@
           </a:p>
         </p:txBody>
       </p:sp>
+      <p:graphicFrame>
+        <p:nvGraphicFramePr>
+          <p:cNvPr id="38" name="표 37"/>
+          <p:cNvGraphicFramePr>
+            <a:graphicFrameLocks noGrp="1"/>
+          </p:cNvGraphicFramePr>
+          <p:nvPr>
+            <p:extLst>
+              <p:ext uri="{D42A27DB-BD31-4B8C-83A1-F6EECF244321}">
+                <p14:modId xmlns:p14="http://schemas.microsoft.com/office/powerpoint/2010/main" val="686568572"/>
+              </p:ext>
+            </p:extLst>
+          </p:nvPr>
+        </p:nvGraphicFramePr>
+        <p:xfrm>
+          <a:off x="224611" y="3803450"/>
+          <a:ext cx="6096000" cy="3330148"/>
+        </p:xfrm>
+        <a:graphic>
+          <a:graphicData uri="http://schemas.openxmlformats.org/drawingml/2006/table">
+            <a:tbl>
+              <a:tblPr firstRow="1" bandRow="1">
+                <a:tableStyleId>{F2DE63D5-997A-4646-A377-4702673A728D}</a:tableStyleId>
+              </a:tblPr>
+              <a:tblGrid>
+                <a:gridCol w="2259157">
+                  <a:extLst>
+                    <a:ext uri="{9D8B030D-6E8A-4147-A177-3AD203B41FA5}">
+                      <a16:colId xmlns:a16="http://schemas.microsoft.com/office/drawing/2014/main" val="20000"/>
+                    </a:ext>
+                  </a:extLst>
+                </a:gridCol>
+                <a:gridCol w="788843">
+                  <a:extLst>
+                    <a:ext uri="{9D8B030D-6E8A-4147-A177-3AD203B41FA5}">
+                      <a16:colId xmlns:a16="http://schemas.microsoft.com/office/drawing/2014/main" val="20001"/>
+                    </a:ext>
+                  </a:extLst>
+                </a:gridCol>
+                <a:gridCol w="1016000">
+                  <a:extLst>
+                    <a:ext uri="{9D8B030D-6E8A-4147-A177-3AD203B41FA5}">
+                      <a16:colId xmlns:a16="http://schemas.microsoft.com/office/drawing/2014/main" val="20002"/>
+                    </a:ext>
+                  </a:extLst>
+                </a:gridCol>
+                <a:gridCol w="2032000">
+                  <a:extLst>
+                    <a:ext uri="{9D8B030D-6E8A-4147-A177-3AD203B41FA5}">
+                      <a16:colId xmlns:a16="http://schemas.microsoft.com/office/drawing/2014/main" val="20003"/>
+                    </a:ext>
+                  </a:extLst>
+                </a:gridCol>
+              </a:tblGrid>
+              <a:tr h="221744">
+                <a:tc gridSpan="2">
+                  <a:txBody>
+                    <a:bodyPr/>
+                    <a:lstStyle/>
+                    <a:p>
+                      <a:pPr algn="ctr" latinLnBrk="1"/>
+                      <a:r>
+                        <a:rPr lang="en-US" altLang="ko-KR" dirty="0" smtClean="0"/>
+                        <a:t>Table Name</a:t>
+                      </a:r>
+                      <a:endParaRPr lang="ko-KR" altLang="en-US" dirty="0"/>
+                    </a:p>
+                  </a:txBody>
+                  <a:tcPr>
+                    <a:lnR w="12700" cap="flat" cmpd="sng" algn="ctr">
+                      <a:solidFill>
+                        <a:schemeClr val="accent3">
+                          <a:lumMod val="60000"/>
+                          <a:lumOff val="40000"/>
+                        </a:schemeClr>
+                      </a:solidFill>
+                      <a:prstDash val="solid"/>
+                      <a:round/>
+                      <a:headEnd type="none" w="med" len="med"/>
+                      <a:tailEnd type="none" w="med" len="med"/>
+                    </a:lnR>
+                  </a:tcPr>
+                </a:tc>
+                <a:tc hMerge="1">
+                  <a:txBody>
+                    <a:bodyPr/>
+                    <a:lstStyle/>
+                    <a:p>
+                      <a:pPr latinLnBrk="1"/>
+                      <a:endParaRPr lang="ko-KR" altLang="en-US" dirty="0"/>
+                    </a:p>
+                  </a:txBody>
+                  <a:tcPr/>
+                </a:tc>
+                <a:tc gridSpan="2">
+                  <a:txBody>
+                    <a:bodyPr/>
+                    <a:lstStyle/>
+                    <a:p>
+                      <a:pPr algn="ctr" latinLnBrk="1"/>
+                      <a:r>
+                        <a:rPr lang="en-US" altLang="ko-KR" dirty="0" smtClean="0"/>
+                        <a:t>T_ENTRY_BOOK</a:t>
+                      </a:r>
+                      <a:endParaRPr lang="ko-KR" altLang="en-US" dirty="0"/>
+                    </a:p>
+                  </a:txBody>
+                  <a:tcPr>
+                    <a:lnL w="12700" cap="flat" cmpd="sng" algn="ctr">
+                      <a:solidFill>
+                        <a:schemeClr val="accent3">
+                          <a:lumMod val="60000"/>
+                          <a:lumOff val="40000"/>
+                        </a:schemeClr>
+                      </a:solidFill>
+                      <a:prstDash val="solid"/>
+                      <a:round/>
+                      <a:headEnd type="none" w="med" len="med"/>
+                      <a:tailEnd type="none" w="med" len="med"/>
+                    </a:lnL>
+                  </a:tcPr>
+                </a:tc>
+                <a:tc hMerge="1">
+                  <a:txBody>
+                    <a:bodyPr/>
+                    <a:lstStyle/>
+                    <a:p>
+                      <a:pPr latinLnBrk="1"/>
+                      <a:endParaRPr lang="ko-KR" altLang="en-US" dirty="0"/>
+                    </a:p>
+                  </a:txBody>
+                  <a:tcPr/>
+                </a:tc>
+                <a:extLst>
+                  <a:ext uri="{0D108BD9-81ED-4DB2-BD59-A6C34878D82A}">
+                    <a16:rowId xmlns:a16="http://schemas.microsoft.com/office/drawing/2014/main" val="10000"/>
+                  </a:ext>
+                </a:extLst>
+              </a:tr>
+              <a:tr h="370840">
+                <a:tc>
+                  <a:txBody>
+                    <a:bodyPr/>
+                    <a:lstStyle/>
+                    <a:p>
+                      <a:pPr algn="ctr" latinLnBrk="1"/>
+                      <a:r>
+                        <a:rPr lang="en-US" altLang="ko-KR" baseline="0" dirty="0" smtClean="0"/>
+                        <a:t>Column Name</a:t>
+                      </a:r>
+                      <a:endParaRPr lang="ko-KR" altLang="en-US" dirty="0"/>
+                    </a:p>
+                  </a:txBody>
+                  <a:tcPr>
+                    <a:lnR w="12700" cap="flat" cmpd="sng" algn="ctr">
+                      <a:solidFill>
+                        <a:schemeClr val="accent3">
+                          <a:lumMod val="60000"/>
+                          <a:lumOff val="40000"/>
+                        </a:schemeClr>
+                      </a:solidFill>
+                      <a:prstDash val="solid"/>
+                      <a:round/>
+                      <a:headEnd type="none" w="med" len="med"/>
+                      <a:tailEnd type="none" w="med" len="med"/>
+                    </a:lnR>
+                    <a:solidFill>
+                      <a:schemeClr val="accent3">
+                        <a:lumMod val="20000"/>
+                        <a:lumOff val="80000"/>
+                      </a:schemeClr>
+                    </a:solidFill>
+                  </a:tcPr>
+                </a:tc>
+                <a:tc gridSpan="2">
+                  <a:txBody>
+                    <a:bodyPr/>
+                    <a:lstStyle/>
+                    <a:p>
+                      <a:pPr algn="ctr" latinLnBrk="1"/>
+                      <a:r>
+                        <a:rPr lang="en-US" altLang="ko-KR" dirty="0" smtClean="0"/>
+                        <a:t>Data</a:t>
+                      </a:r>
+                      <a:r>
+                        <a:rPr lang="en-US" altLang="ko-KR" baseline="0" dirty="0" smtClean="0"/>
+                        <a:t> Type</a:t>
+                      </a:r>
+                      <a:endParaRPr lang="ko-KR" altLang="en-US" dirty="0"/>
+                    </a:p>
+                  </a:txBody>
+                  <a:tcPr>
+                    <a:lnL w="12700" cap="flat" cmpd="sng" algn="ctr">
+                      <a:solidFill>
+                        <a:schemeClr val="accent3">
+                          <a:lumMod val="60000"/>
+                          <a:lumOff val="40000"/>
+                        </a:schemeClr>
+                      </a:solidFill>
+                      <a:prstDash val="solid"/>
+                      <a:round/>
+                      <a:headEnd type="none" w="med" len="med"/>
+                      <a:tailEnd type="none" w="med" len="med"/>
+                    </a:lnL>
+                    <a:lnR w="12700" cap="flat" cmpd="sng" algn="ctr">
+                      <a:solidFill>
+                        <a:schemeClr val="accent3">
+                          <a:lumMod val="60000"/>
+                          <a:lumOff val="40000"/>
+                        </a:schemeClr>
+                      </a:solidFill>
+                      <a:prstDash val="solid"/>
+                      <a:round/>
+                      <a:headEnd type="none" w="med" len="med"/>
+                      <a:tailEnd type="none" w="med" len="med"/>
+                    </a:lnR>
+                    <a:solidFill>
+                      <a:schemeClr val="accent3">
+                        <a:lumMod val="20000"/>
+                        <a:lumOff val="80000"/>
+                      </a:schemeClr>
+                    </a:solidFill>
+                  </a:tcPr>
+                </a:tc>
+                <a:tc hMerge="1">
+                  <a:txBody>
+                    <a:bodyPr/>
+                    <a:lstStyle/>
+                    <a:p>
+                      <a:pPr latinLnBrk="1"/>
+                      <a:endParaRPr lang="ko-KR" altLang="en-US"/>
+                    </a:p>
+                  </a:txBody>
+                  <a:tcPr/>
+                </a:tc>
+                <a:tc>
+                  <a:txBody>
+                    <a:bodyPr/>
+                    <a:lstStyle/>
+                    <a:p>
+                      <a:pPr algn="ctr" latinLnBrk="1"/>
+                      <a:r>
+                        <a:rPr lang="en-US" altLang="ko-KR" dirty="0" smtClean="0"/>
+                        <a:t>Option</a:t>
+                      </a:r>
+                      <a:endParaRPr lang="ko-KR" altLang="en-US" dirty="0"/>
+                    </a:p>
+                  </a:txBody>
+                  <a:tcPr>
+                    <a:lnL w="12700" cap="flat" cmpd="sng" algn="ctr">
+                      <a:solidFill>
+                        <a:schemeClr val="accent3">
+                          <a:lumMod val="60000"/>
+                          <a:lumOff val="40000"/>
+                        </a:schemeClr>
+                      </a:solidFill>
+                      <a:prstDash val="solid"/>
+                      <a:round/>
+                      <a:headEnd type="none" w="med" len="med"/>
+                      <a:tailEnd type="none" w="med" len="med"/>
+                    </a:lnL>
+                    <a:solidFill>
+                      <a:schemeClr val="accent3">
+                        <a:lumMod val="20000"/>
+                        <a:lumOff val="80000"/>
+                      </a:schemeClr>
+                    </a:solidFill>
+                  </a:tcPr>
+                </a:tc>
+                <a:extLst>
+                  <a:ext uri="{0D108BD9-81ED-4DB2-BD59-A6C34878D82A}">
+                    <a16:rowId xmlns:a16="http://schemas.microsoft.com/office/drawing/2014/main" val="10001"/>
+                  </a:ext>
+                </a:extLst>
+              </a:tr>
+              <a:tr h="370840">
+                <a:tc>
+                  <a:txBody>
+                    <a:bodyPr/>
+                    <a:lstStyle/>
+                    <a:p>
+                      <a:pPr algn="ctr" latinLnBrk="1"/>
+                      <a:r>
+                        <a:rPr lang="en-US" altLang="ko-KR" dirty="0" smtClean="0"/>
+                        <a:t>VEHICLE_NUMBER</a:t>
+                      </a:r>
+                      <a:endParaRPr lang="ko-KR" altLang="en-US" dirty="0"/>
+                    </a:p>
+                  </a:txBody>
+                  <a:tcPr>
+                    <a:lnR w="12700" cap="flat" cmpd="sng" algn="ctr">
+                      <a:solidFill>
+                        <a:schemeClr val="accent3">
+                          <a:lumMod val="60000"/>
+                          <a:lumOff val="40000"/>
+                        </a:schemeClr>
+                      </a:solidFill>
+                      <a:prstDash val="solid"/>
+                      <a:round/>
+                      <a:headEnd type="none" w="med" len="med"/>
+                      <a:tailEnd type="none" w="med" len="med"/>
+                    </a:lnR>
+                  </a:tcPr>
+                </a:tc>
+                <a:tc gridSpan="2">
+                  <a:txBody>
+                    <a:bodyPr/>
+                    <a:lstStyle/>
+                    <a:p>
+                      <a:pPr algn="ctr" latinLnBrk="1"/>
+                      <a:r>
+                        <a:rPr lang="en-US" altLang="ko-KR" dirty="0" smtClean="0"/>
+                        <a:t>VARCHAR(20)</a:t>
+                      </a:r>
+                      <a:endParaRPr lang="ko-KR" altLang="en-US" dirty="0"/>
+                    </a:p>
+                  </a:txBody>
+                  <a:tcPr>
+                    <a:lnL w="12700" cap="flat" cmpd="sng" algn="ctr">
+                      <a:solidFill>
+                        <a:schemeClr val="accent3">
+                          <a:lumMod val="60000"/>
+                          <a:lumOff val="40000"/>
+                        </a:schemeClr>
+                      </a:solidFill>
+                      <a:prstDash val="solid"/>
+                      <a:round/>
+                      <a:headEnd type="none" w="med" len="med"/>
+                      <a:tailEnd type="none" w="med" len="med"/>
+                    </a:lnL>
+                    <a:lnR w="12700" cap="flat" cmpd="sng" algn="ctr">
+                      <a:solidFill>
+                        <a:schemeClr val="accent3">
+                          <a:lumMod val="60000"/>
+                          <a:lumOff val="40000"/>
+                        </a:schemeClr>
+                      </a:solidFill>
+                      <a:prstDash val="solid"/>
+                      <a:round/>
+                      <a:headEnd type="none" w="med" len="med"/>
+                      <a:tailEnd type="none" w="med" len="med"/>
+                    </a:lnR>
+                  </a:tcPr>
+                </a:tc>
+                <a:tc hMerge="1">
+                  <a:txBody>
+                    <a:bodyPr/>
+                    <a:lstStyle/>
+                    <a:p>
+                      <a:pPr latinLnBrk="1"/>
+                      <a:endParaRPr lang="ko-KR" altLang="en-US"/>
+                    </a:p>
+                  </a:txBody>
+                  <a:tcPr/>
+                </a:tc>
+                <a:tc>
+                  <a:txBody>
+                    <a:bodyPr/>
+                    <a:lstStyle/>
+                    <a:p>
+                      <a:pPr algn="ctr" latinLnBrk="1"/>
+                      <a:r>
+                        <a:rPr lang="en-US" altLang="ko-KR" baseline="0" dirty="0" smtClean="0"/>
+                        <a:t>Primary key</a:t>
+                      </a:r>
+                    </a:p>
+                  </a:txBody>
+                  <a:tcPr>
+                    <a:lnL w="12700" cap="flat" cmpd="sng" algn="ctr">
+                      <a:solidFill>
+                        <a:schemeClr val="accent3">
+                          <a:lumMod val="60000"/>
+                          <a:lumOff val="40000"/>
+                        </a:schemeClr>
+                      </a:solidFill>
+                      <a:prstDash val="solid"/>
+                      <a:round/>
+                      <a:headEnd type="none" w="med" len="med"/>
+                      <a:tailEnd type="none" w="med" len="med"/>
+                    </a:lnL>
+                  </a:tcPr>
+                </a:tc>
+                <a:extLst>
+                  <a:ext uri="{0D108BD9-81ED-4DB2-BD59-A6C34878D82A}">
+                    <a16:rowId xmlns:a16="http://schemas.microsoft.com/office/drawing/2014/main" val="10002"/>
+                  </a:ext>
+                </a:extLst>
+              </a:tr>
+              <a:tr h="370840">
+                <a:tc>
+                  <a:txBody>
+                    <a:bodyPr/>
+                    <a:lstStyle/>
+                    <a:p>
+                      <a:pPr algn="ctr" latinLnBrk="1"/>
+                      <a:r>
+                        <a:rPr lang="en-US" altLang="ko-KR" dirty="0" smtClean="0"/>
+                        <a:t>CLIENT_NUMBER</a:t>
+                      </a:r>
+                      <a:endParaRPr lang="ko-KR" altLang="en-US" dirty="0"/>
+                    </a:p>
+                  </a:txBody>
+                  <a:tcPr>
+                    <a:lnR w="12700" cap="flat" cmpd="sng" algn="ctr">
+                      <a:solidFill>
+                        <a:schemeClr val="accent3">
+                          <a:lumMod val="60000"/>
+                          <a:lumOff val="40000"/>
+                        </a:schemeClr>
+                      </a:solidFill>
+                      <a:prstDash val="solid"/>
+                      <a:round/>
+                      <a:headEnd type="none" w="med" len="med"/>
+                      <a:tailEnd type="none" w="med" len="med"/>
+                    </a:lnR>
+                  </a:tcPr>
+                </a:tc>
+                <a:tc gridSpan="2">
+                  <a:txBody>
+                    <a:bodyPr/>
+                    <a:lstStyle/>
+                    <a:p>
+                      <a:pPr algn="ctr" latinLnBrk="1"/>
+                      <a:r>
+                        <a:rPr lang="en-US" altLang="ko-KR" dirty="0" smtClean="0"/>
+                        <a:t>VARCHAR(10)</a:t>
+                      </a:r>
+                      <a:endParaRPr lang="ko-KR" altLang="en-US" dirty="0"/>
+                    </a:p>
+                  </a:txBody>
+                  <a:tcPr>
+                    <a:lnL w="12700" cap="flat" cmpd="sng" algn="ctr">
+                      <a:solidFill>
+                        <a:schemeClr val="accent3">
+                          <a:lumMod val="60000"/>
+                          <a:lumOff val="40000"/>
+                        </a:schemeClr>
+                      </a:solidFill>
+                      <a:prstDash val="solid"/>
+                      <a:round/>
+                      <a:headEnd type="none" w="med" len="med"/>
+                      <a:tailEnd type="none" w="med" len="med"/>
+                    </a:lnL>
+                    <a:lnR w="12700" cap="flat" cmpd="sng" algn="ctr">
+                      <a:solidFill>
+                        <a:schemeClr val="accent3">
+                          <a:lumMod val="60000"/>
+                          <a:lumOff val="40000"/>
+                        </a:schemeClr>
+                      </a:solidFill>
+                      <a:prstDash val="solid"/>
+                      <a:round/>
+                      <a:headEnd type="none" w="med" len="med"/>
+                      <a:tailEnd type="none" w="med" len="med"/>
+                    </a:lnR>
+                  </a:tcPr>
+                </a:tc>
+                <a:tc hMerge="1">
+                  <a:txBody>
+                    <a:bodyPr/>
+                    <a:lstStyle/>
+                    <a:p>
+                      <a:pPr latinLnBrk="1"/>
+                      <a:endParaRPr lang="ko-KR" altLang="en-US"/>
+                    </a:p>
+                  </a:txBody>
+                  <a:tcPr/>
+                </a:tc>
+                <a:tc>
+                  <a:txBody>
+                    <a:bodyPr/>
+                    <a:lstStyle/>
+                    <a:p>
+                      <a:pPr algn="ctr" latinLnBrk="1"/>
+                      <a:r>
+                        <a:rPr lang="en-US" altLang="ko-KR" dirty="0" smtClean="0"/>
+                        <a:t>NOT</a:t>
+                      </a:r>
+                      <a:r>
+                        <a:rPr lang="en-US" altLang="ko-KR" baseline="0" dirty="0" smtClean="0"/>
+                        <a:t> NULL</a:t>
+                      </a:r>
+                      <a:endParaRPr lang="ko-KR" altLang="en-US" dirty="0"/>
+                    </a:p>
+                  </a:txBody>
+                  <a:tcPr>
+                    <a:lnL w="12700" cap="flat" cmpd="sng" algn="ctr">
+                      <a:solidFill>
+                        <a:schemeClr val="accent3">
+                          <a:lumMod val="60000"/>
+                          <a:lumOff val="40000"/>
+                        </a:schemeClr>
+                      </a:solidFill>
+                      <a:prstDash val="solid"/>
+                      <a:round/>
+                      <a:headEnd type="none" w="med" len="med"/>
+                      <a:tailEnd type="none" w="med" len="med"/>
+                    </a:lnL>
+                  </a:tcPr>
+                </a:tc>
+                <a:extLst>
+                  <a:ext uri="{0D108BD9-81ED-4DB2-BD59-A6C34878D82A}">
+                    <a16:rowId xmlns:a16="http://schemas.microsoft.com/office/drawing/2014/main" val="10003"/>
+                  </a:ext>
+                </a:extLst>
+              </a:tr>
+              <a:tr h="370840">
+                <a:tc>
+                  <a:txBody>
+                    <a:bodyPr/>
+                    <a:lstStyle/>
+                    <a:p>
+                      <a:pPr algn="ctr" latinLnBrk="1"/>
+                      <a:r>
+                        <a:rPr lang="en-US" altLang="ko-KR" dirty="0" smtClean="0"/>
+                        <a:t>ARRIVAL_TIME</a:t>
+                      </a:r>
+                      <a:endParaRPr lang="ko-KR" altLang="en-US" dirty="0"/>
+                    </a:p>
+                  </a:txBody>
+                  <a:tcPr>
+                    <a:lnR w="12700" cap="flat" cmpd="sng" algn="ctr">
+                      <a:solidFill>
+                        <a:schemeClr val="accent3">
+                          <a:lumMod val="60000"/>
+                          <a:lumOff val="40000"/>
+                        </a:schemeClr>
+                      </a:solidFill>
+                      <a:prstDash val="solid"/>
+                      <a:round/>
+                      <a:headEnd type="none" w="med" len="med"/>
+                      <a:tailEnd type="none" w="med" len="med"/>
+                    </a:lnR>
+                  </a:tcPr>
+                </a:tc>
+                <a:tc gridSpan="2">
+                  <a:txBody>
+                    <a:bodyPr/>
+                    <a:lstStyle/>
+                    <a:p>
+                      <a:pPr algn="ctr" latinLnBrk="1"/>
+                      <a:r>
+                        <a:rPr lang="en-US" altLang="ko-KR" dirty="0" smtClean="0"/>
+                        <a:t>TIMESTAMP</a:t>
+                      </a:r>
+                      <a:endParaRPr lang="ko-KR" altLang="en-US" dirty="0"/>
+                    </a:p>
+                  </a:txBody>
+                  <a:tcPr>
+                    <a:lnL w="12700" cap="flat" cmpd="sng" algn="ctr">
+                      <a:solidFill>
+                        <a:schemeClr val="accent3">
+                          <a:lumMod val="60000"/>
+                          <a:lumOff val="40000"/>
+                        </a:schemeClr>
+                      </a:solidFill>
+                      <a:prstDash val="solid"/>
+                      <a:round/>
+                      <a:headEnd type="none" w="med" len="med"/>
+                      <a:tailEnd type="none" w="med" len="med"/>
+                    </a:lnL>
+                    <a:lnR w="12700" cap="flat" cmpd="sng" algn="ctr">
+                      <a:solidFill>
+                        <a:schemeClr val="accent3">
+                          <a:lumMod val="60000"/>
+                          <a:lumOff val="40000"/>
+                        </a:schemeClr>
+                      </a:solidFill>
+                      <a:prstDash val="solid"/>
+                      <a:round/>
+                      <a:headEnd type="none" w="med" len="med"/>
+                      <a:tailEnd type="none" w="med" len="med"/>
+                    </a:lnR>
+                  </a:tcPr>
+                </a:tc>
+                <a:tc hMerge="1">
+                  <a:txBody>
+                    <a:bodyPr/>
+                    <a:lstStyle/>
+                    <a:p>
+                      <a:pPr latinLnBrk="1"/>
+                      <a:endParaRPr lang="ko-KR" altLang="en-US"/>
+                    </a:p>
+                  </a:txBody>
+                  <a:tcPr/>
+                </a:tc>
+                <a:tc>
+                  <a:txBody>
+                    <a:bodyPr/>
+                    <a:lstStyle/>
+                    <a:p>
+                      <a:pPr marL="0" marR="0" indent="0" algn="ctr" defTabSz="914400" rtl="0" eaLnBrk="1" fontAlgn="auto" latinLnBrk="1" hangingPunct="1">
+                        <a:lnSpc>
+                          <a:spcPct val="100000"/>
+                        </a:lnSpc>
+                        <a:spcBef>
+                          <a:spcPts val="0"/>
+                        </a:spcBef>
+                        <a:spcAft>
+                          <a:spcPts val="0"/>
+                        </a:spcAft>
+                        <a:buClrTx/>
+                        <a:buSzTx/>
+                        <a:buFontTx/>
+                        <a:buNone/>
+                        <a:tabLst/>
+                        <a:defRPr/>
+                      </a:pPr>
+                      <a:r>
+                        <a:rPr lang="en-US" altLang="ko-KR" dirty="0" smtClean="0"/>
+                        <a:t>NOT</a:t>
+                      </a:r>
+                      <a:r>
+                        <a:rPr lang="en-US" altLang="ko-KR" baseline="0" dirty="0" smtClean="0"/>
+                        <a:t> NULL</a:t>
+                      </a:r>
+                      <a:endParaRPr lang="ko-KR" altLang="en-US" dirty="0" smtClean="0"/>
+                    </a:p>
+                  </a:txBody>
+                  <a:tcPr>
+                    <a:lnL w="12700" cap="flat" cmpd="sng" algn="ctr">
+                      <a:solidFill>
+                        <a:schemeClr val="accent3">
+                          <a:lumMod val="60000"/>
+                          <a:lumOff val="40000"/>
+                        </a:schemeClr>
+                      </a:solidFill>
+                      <a:prstDash val="solid"/>
+                      <a:round/>
+                      <a:headEnd type="none" w="med" len="med"/>
+                      <a:tailEnd type="none" w="med" len="med"/>
+                    </a:lnL>
+                  </a:tcPr>
+                </a:tc>
+                <a:extLst>
+                  <a:ext uri="{0D108BD9-81ED-4DB2-BD59-A6C34878D82A}">
+                    <a16:rowId xmlns:a16="http://schemas.microsoft.com/office/drawing/2014/main" val="10004"/>
+                  </a:ext>
+                </a:extLst>
+              </a:tr>
+              <a:tr h="370840">
+                <a:tc>
+                  <a:txBody>
+                    <a:bodyPr/>
+                    <a:lstStyle/>
+                    <a:p>
+                      <a:pPr algn="ctr" latinLnBrk="1"/>
+                      <a:r>
+                        <a:rPr lang="en-US" altLang="ko-KR" dirty="0" smtClean="0"/>
+                        <a:t>DEPARTURE_TIME</a:t>
+                      </a:r>
+                      <a:endParaRPr lang="ko-KR" altLang="en-US" dirty="0"/>
+                    </a:p>
+                  </a:txBody>
+                  <a:tcPr>
+                    <a:lnR w="12700" cap="flat" cmpd="sng" algn="ctr">
+                      <a:solidFill>
+                        <a:schemeClr val="accent3">
+                          <a:lumMod val="60000"/>
+                          <a:lumOff val="40000"/>
+                        </a:schemeClr>
+                      </a:solidFill>
+                      <a:prstDash val="solid"/>
+                      <a:round/>
+                      <a:headEnd type="none" w="med" len="med"/>
+                      <a:tailEnd type="none" w="med" len="med"/>
+                    </a:lnR>
+                  </a:tcPr>
+                </a:tc>
+                <a:tc gridSpan="2">
+                  <a:txBody>
+                    <a:bodyPr/>
+                    <a:lstStyle/>
+                    <a:p>
+                      <a:pPr marL="0" marR="0" indent="0" algn="ctr" defTabSz="914400" rtl="0" eaLnBrk="1" fontAlgn="auto" latinLnBrk="1" hangingPunct="1">
+                        <a:lnSpc>
+                          <a:spcPct val="100000"/>
+                        </a:lnSpc>
+                        <a:spcBef>
+                          <a:spcPts val="0"/>
+                        </a:spcBef>
+                        <a:spcAft>
+                          <a:spcPts val="0"/>
+                        </a:spcAft>
+                        <a:buClrTx/>
+                        <a:buSzTx/>
+                        <a:buFontTx/>
+                        <a:buNone/>
+                        <a:tabLst/>
+                        <a:defRPr/>
+                      </a:pPr>
+                      <a:r>
+                        <a:rPr lang="en-US" altLang="ko-KR" dirty="0" smtClean="0"/>
+                        <a:t>TIMESTAMP</a:t>
+                      </a:r>
+                      <a:endParaRPr lang="ko-KR" altLang="en-US" dirty="0" smtClean="0"/>
+                    </a:p>
+                  </a:txBody>
+                  <a:tcPr>
+                    <a:lnL w="12700" cap="flat" cmpd="sng" algn="ctr">
+                      <a:solidFill>
+                        <a:schemeClr val="accent3">
+                          <a:lumMod val="60000"/>
+                          <a:lumOff val="40000"/>
+                        </a:schemeClr>
+                      </a:solidFill>
+                      <a:prstDash val="solid"/>
+                      <a:round/>
+                      <a:headEnd type="none" w="med" len="med"/>
+                      <a:tailEnd type="none" w="med" len="med"/>
+                    </a:lnL>
+                    <a:lnR w="12700" cap="flat" cmpd="sng" algn="ctr">
+                      <a:solidFill>
+                        <a:schemeClr val="accent3">
+                          <a:lumMod val="60000"/>
+                          <a:lumOff val="40000"/>
+                        </a:schemeClr>
+                      </a:solidFill>
+                      <a:prstDash val="solid"/>
+                      <a:round/>
+                      <a:headEnd type="none" w="med" len="med"/>
+                      <a:tailEnd type="none" w="med" len="med"/>
+                    </a:lnR>
+                  </a:tcPr>
+                </a:tc>
+                <a:tc hMerge="1">
+                  <a:txBody>
+                    <a:bodyPr/>
+                    <a:lstStyle/>
+                    <a:p>
+                      <a:pPr latinLnBrk="1"/>
+                      <a:endParaRPr lang="ko-KR" altLang="en-US"/>
+                    </a:p>
+                  </a:txBody>
+                  <a:tcPr/>
+                </a:tc>
+                <a:tc>
+                  <a:txBody>
+                    <a:bodyPr/>
+                    <a:lstStyle/>
+                    <a:p>
+                      <a:pPr marL="0" marR="0" indent="0" algn="ctr" defTabSz="914400" rtl="0" eaLnBrk="1" fontAlgn="auto" latinLnBrk="1" hangingPunct="1">
+                        <a:lnSpc>
+                          <a:spcPct val="100000"/>
+                        </a:lnSpc>
+                        <a:spcBef>
+                          <a:spcPts val="0"/>
+                        </a:spcBef>
+                        <a:spcAft>
+                          <a:spcPts val="0"/>
+                        </a:spcAft>
+                        <a:buClrTx/>
+                        <a:buSzTx/>
+                        <a:buFontTx/>
+                        <a:buNone/>
+                        <a:tabLst/>
+                        <a:defRPr/>
+                      </a:pPr>
+                      <a:r>
+                        <a:rPr lang="en-US" altLang="ko-KR" dirty="0" smtClean="0"/>
+                        <a:t>NULLABLE</a:t>
+                      </a:r>
+                      <a:endParaRPr lang="ko-KR" altLang="en-US" dirty="0" smtClean="0"/>
+                    </a:p>
+                  </a:txBody>
+                  <a:tcPr>
+                    <a:lnL w="12700" cap="flat" cmpd="sng" algn="ctr">
+                      <a:solidFill>
+                        <a:schemeClr val="accent3">
+                          <a:lumMod val="60000"/>
+                          <a:lumOff val="40000"/>
+                        </a:schemeClr>
+                      </a:solidFill>
+                      <a:prstDash val="solid"/>
+                      <a:round/>
+                      <a:headEnd type="none" w="med" len="med"/>
+                      <a:tailEnd type="none" w="med" len="med"/>
+                    </a:lnL>
+                  </a:tcPr>
+                </a:tc>
+                <a:extLst>
+                  <a:ext uri="{0D108BD9-81ED-4DB2-BD59-A6C34878D82A}">
+                    <a16:rowId xmlns:a16="http://schemas.microsoft.com/office/drawing/2014/main" val="10005"/>
+                  </a:ext>
+                </a:extLst>
+              </a:tr>
+              <a:tr h="368508">
+                <a:tc>
+                  <a:txBody>
+                    <a:bodyPr/>
+                    <a:lstStyle/>
+                    <a:p>
+                      <a:pPr algn="ctr" latinLnBrk="1"/>
+                      <a:r>
+                        <a:rPr lang="en-US" altLang="ko-KR" dirty="0" smtClean="0"/>
+                        <a:t>HOURS_OF_USE</a:t>
+                      </a:r>
+                      <a:endParaRPr lang="ko-KR" altLang="en-US" dirty="0"/>
+                    </a:p>
+                  </a:txBody>
+                  <a:tcPr>
+                    <a:lnR w="12700" cap="flat" cmpd="sng" algn="ctr">
+                      <a:solidFill>
+                        <a:schemeClr val="accent3">
+                          <a:lumMod val="60000"/>
+                          <a:lumOff val="40000"/>
+                        </a:schemeClr>
+                      </a:solidFill>
+                      <a:prstDash val="solid"/>
+                      <a:round/>
+                      <a:headEnd type="none" w="med" len="med"/>
+                      <a:tailEnd type="none" w="med" len="med"/>
+                    </a:lnR>
+                  </a:tcPr>
+                </a:tc>
+                <a:tc gridSpan="2">
+                  <a:txBody>
+                    <a:bodyPr/>
+                    <a:lstStyle/>
+                    <a:p>
+                      <a:pPr marL="0" marR="0" indent="0" algn="ctr" defTabSz="914400" rtl="0" eaLnBrk="1" fontAlgn="auto" latinLnBrk="1" hangingPunct="1">
+                        <a:lnSpc>
+                          <a:spcPct val="100000"/>
+                        </a:lnSpc>
+                        <a:spcBef>
+                          <a:spcPts val="0"/>
+                        </a:spcBef>
+                        <a:spcAft>
+                          <a:spcPts val="0"/>
+                        </a:spcAft>
+                        <a:buClrTx/>
+                        <a:buSzTx/>
+                        <a:buFontTx/>
+                        <a:buNone/>
+                        <a:tabLst/>
+                        <a:defRPr/>
+                      </a:pPr>
+                      <a:r>
+                        <a:rPr lang="en-US" altLang="ko-KR" dirty="0" smtClean="0"/>
+                        <a:t>NUMBER(2)</a:t>
+                      </a:r>
+                      <a:endParaRPr lang="ko-KR" altLang="en-US" dirty="0" smtClean="0"/>
+                    </a:p>
+                  </a:txBody>
+                  <a:tcPr>
+                    <a:lnL w="12700" cap="flat" cmpd="sng" algn="ctr">
+                      <a:solidFill>
+                        <a:schemeClr val="accent3">
+                          <a:lumMod val="60000"/>
+                          <a:lumOff val="40000"/>
+                        </a:schemeClr>
+                      </a:solidFill>
+                      <a:prstDash val="solid"/>
+                      <a:round/>
+                      <a:headEnd type="none" w="med" len="med"/>
+                      <a:tailEnd type="none" w="med" len="med"/>
+                    </a:lnL>
+                    <a:lnR w="12700" cap="flat" cmpd="sng" algn="ctr">
+                      <a:solidFill>
+                        <a:schemeClr val="accent3">
+                          <a:lumMod val="60000"/>
+                          <a:lumOff val="40000"/>
+                        </a:schemeClr>
+                      </a:solidFill>
+                      <a:prstDash val="solid"/>
+                      <a:round/>
+                      <a:headEnd type="none" w="med" len="med"/>
+                      <a:tailEnd type="none" w="med" len="med"/>
+                    </a:lnR>
+                  </a:tcPr>
+                </a:tc>
+                <a:tc hMerge="1">
+                  <a:txBody>
+                    <a:bodyPr/>
+                    <a:lstStyle/>
+                    <a:p>
+                      <a:pPr latinLnBrk="1"/>
+                      <a:endParaRPr lang="ko-KR" altLang="en-US"/>
+                    </a:p>
+                  </a:txBody>
+                  <a:tcPr/>
+                </a:tc>
+                <a:tc>
+                  <a:txBody>
+                    <a:bodyPr/>
+                    <a:lstStyle/>
+                    <a:p>
+                      <a:pPr marL="0" marR="0" indent="0" algn="ctr" defTabSz="914400" rtl="0" eaLnBrk="1" fontAlgn="auto" latinLnBrk="1" hangingPunct="1">
+                        <a:lnSpc>
+                          <a:spcPct val="100000"/>
+                        </a:lnSpc>
+                        <a:spcBef>
+                          <a:spcPts val="0"/>
+                        </a:spcBef>
+                        <a:spcAft>
+                          <a:spcPts val="0"/>
+                        </a:spcAft>
+                        <a:buClrTx/>
+                        <a:buSzTx/>
+                        <a:buFontTx/>
+                        <a:buNone/>
+                        <a:tabLst/>
+                        <a:defRPr/>
+                      </a:pPr>
+                      <a:r>
+                        <a:rPr lang="en-US" altLang="ko-KR" dirty="0" smtClean="0"/>
+                        <a:t>NULLABLE</a:t>
+                      </a:r>
+                      <a:endParaRPr lang="ko-KR" altLang="en-US" dirty="0" smtClean="0"/>
+                    </a:p>
+                  </a:txBody>
+                  <a:tcPr>
+                    <a:lnL w="12700" cap="flat" cmpd="sng" algn="ctr">
+                      <a:solidFill>
+                        <a:schemeClr val="accent3">
+                          <a:lumMod val="60000"/>
+                          <a:lumOff val="40000"/>
+                        </a:schemeClr>
+                      </a:solidFill>
+                      <a:prstDash val="solid"/>
+                      <a:round/>
+                      <a:headEnd type="none" w="med" len="med"/>
+                      <a:tailEnd type="none" w="med" len="med"/>
+                    </a:lnL>
+                  </a:tcPr>
+                </a:tc>
+                <a:extLst>
+                  <a:ext uri="{0D108BD9-81ED-4DB2-BD59-A6C34878D82A}">
+                    <a16:rowId xmlns:a16="http://schemas.microsoft.com/office/drawing/2014/main" val="10006"/>
+                  </a:ext>
+                </a:extLst>
+              </a:tr>
+              <a:tr h="370840">
+                <a:tc>
+                  <a:txBody>
+                    <a:bodyPr/>
+                    <a:lstStyle/>
+                    <a:p>
+                      <a:pPr algn="ctr" latinLnBrk="1"/>
+                      <a:r>
+                        <a:rPr lang="en-US" altLang="ko-KR" dirty="0" smtClean="0"/>
+                        <a:t>COST_OF_USE</a:t>
+                      </a:r>
+                      <a:endParaRPr lang="ko-KR" altLang="en-US" dirty="0"/>
+                    </a:p>
+                  </a:txBody>
+                  <a:tcPr>
+                    <a:lnR w="12700" cap="flat" cmpd="sng" algn="ctr">
+                      <a:solidFill>
+                        <a:schemeClr val="accent3">
+                          <a:lumMod val="60000"/>
+                          <a:lumOff val="40000"/>
+                        </a:schemeClr>
+                      </a:solidFill>
+                      <a:prstDash val="solid"/>
+                      <a:round/>
+                      <a:headEnd type="none" w="med" len="med"/>
+                      <a:tailEnd type="none" w="med" len="med"/>
+                    </a:lnR>
+                  </a:tcPr>
+                </a:tc>
+                <a:tc gridSpan="2">
+                  <a:txBody>
+                    <a:bodyPr/>
+                    <a:lstStyle/>
+                    <a:p>
+                      <a:pPr marL="0" marR="0" indent="0" algn="ctr" defTabSz="914400" rtl="0" eaLnBrk="1" fontAlgn="auto" latinLnBrk="1" hangingPunct="1">
+                        <a:lnSpc>
+                          <a:spcPct val="100000"/>
+                        </a:lnSpc>
+                        <a:spcBef>
+                          <a:spcPts val="0"/>
+                        </a:spcBef>
+                        <a:spcAft>
+                          <a:spcPts val="0"/>
+                        </a:spcAft>
+                        <a:buClrTx/>
+                        <a:buSzTx/>
+                        <a:buFontTx/>
+                        <a:buNone/>
+                        <a:tabLst/>
+                        <a:defRPr/>
+                      </a:pPr>
+                      <a:r>
+                        <a:rPr lang="en-US" altLang="ko-KR" dirty="0" smtClean="0"/>
+                        <a:t>NUMBER(2)</a:t>
+                      </a:r>
+                      <a:endParaRPr lang="ko-KR" altLang="en-US" dirty="0" smtClean="0"/>
+                    </a:p>
+                  </a:txBody>
+                  <a:tcPr>
+                    <a:lnL w="12700" cap="flat" cmpd="sng" algn="ctr">
+                      <a:solidFill>
+                        <a:schemeClr val="accent3">
+                          <a:lumMod val="60000"/>
+                          <a:lumOff val="40000"/>
+                        </a:schemeClr>
+                      </a:solidFill>
+                      <a:prstDash val="solid"/>
+                      <a:round/>
+                      <a:headEnd type="none" w="med" len="med"/>
+                      <a:tailEnd type="none" w="med" len="med"/>
+                    </a:lnL>
+                    <a:lnR w="12700" cap="flat" cmpd="sng" algn="ctr">
+                      <a:solidFill>
+                        <a:schemeClr val="accent3">
+                          <a:lumMod val="60000"/>
+                          <a:lumOff val="40000"/>
+                        </a:schemeClr>
+                      </a:solidFill>
+                      <a:prstDash val="solid"/>
+                      <a:round/>
+                      <a:headEnd type="none" w="med" len="med"/>
+                      <a:tailEnd type="none" w="med" len="med"/>
+                    </a:lnR>
+                  </a:tcPr>
+                </a:tc>
+                <a:tc hMerge="1">
+                  <a:txBody>
+                    <a:bodyPr/>
+                    <a:lstStyle/>
+                    <a:p>
+                      <a:pPr latinLnBrk="1"/>
+                      <a:endParaRPr lang="ko-KR" altLang="en-US"/>
+                    </a:p>
+                  </a:txBody>
+                  <a:tcPr/>
+                </a:tc>
+                <a:tc>
+                  <a:txBody>
+                    <a:bodyPr/>
+                    <a:lstStyle/>
+                    <a:p>
+                      <a:pPr marL="0" marR="0" indent="0" algn="ctr" defTabSz="914400" rtl="0" eaLnBrk="1" fontAlgn="auto" latinLnBrk="1" hangingPunct="1">
+                        <a:lnSpc>
+                          <a:spcPct val="100000"/>
+                        </a:lnSpc>
+                        <a:spcBef>
+                          <a:spcPts val="0"/>
+                        </a:spcBef>
+                        <a:spcAft>
+                          <a:spcPts val="0"/>
+                        </a:spcAft>
+                        <a:buClrTx/>
+                        <a:buSzTx/>
+                        <a:buFontTx/>
+                        <a:buNone/>
+                        <a:tabLst/>
+                        <a:defRPr/>
+                      </a:pPr>
+                      <a:r>
+                        <a:rPr lang="en-US" altLang="ko-KR" dirty="0" smtClean="0"/>
+                        <a:t>NULLABLE</a:t>
+                      </a:r>
+                      <a:endParaRPr lang="ko-KR" altLang="en-US" dirty="0" smtClean="0"/>
+                    </a:p>
+                  </a:txBody>
+                  <a:tcPr>
+                    <a:lnL w="12700" cap="flat" cmpd="sng" algn="ctr">
+                      <a:solidFill>
+                        <a:schemeClr val="accent3">
+                          <a:lumMod val="60000"/>
+                          <a:lumOff val="40000"/>
+                        </a:schemeClr>
+                      </a:solidFill>
+                      <a:prstDash val="solid"/>
+                      <a:round/>
+                      <a:headEnd type="none" w="med" len="med"/>
+                      <a:tailEnd type="none" w="med" len="med"/>
+                    </a:lnL>
+                  </a:tcPr>
+                </a:tc>
+                <a:extLst>
+                  <a:ext uri="{0D108BD9-81ED-4DB2-BD59-A6C34878D82A}">
+                    <a16:rowId xmlns:a16="http://schemas.microsoft.com/office/drawing/2014/main" val="10007"/>
+                  </a:ext>
+                </a:extLst>
+              </a:tr>
+              <a:tr h="370840">
+                <a:tc>
+                  <a:txBody>
+                    <a:bodyPr/>
+                    <a:lstStyle/>
+                    <a:p>
+                      <a:pPr algn="ctr" latinLnBrk="1"/>
+                      <a:r>
+                        <a:rPr lang="en-US" altLang="ko-KR" dirty="0" smtClean="0"/>
+                        <a:t>END_BISUNESS_FLG</a:t>
+                      </a:r>
+                      <a:endParaRPr lang="ko-KR" altLang="en-US" dirty="0"/>
+                    </a:p>
+                  </a:txBody>
+                  <a:tcPr>
+                    <a:lnR w="12700" cap="flat" cmpd="sng" algn="ctr">
+                      <a:solidFill>
+                        <a:schemeClr val="accent3">
+                          <a:lumMod val="60000"/>
+                          <a:lumOff val="40000"/>
+                        </a:schemeClr>
+                      </a:solidFill>
+                      <a:prstDash val="solid"/>
+                      <a:round/>
+                      <a:headEnd type="none" w="med" len="med"/>
+                      <a:tailEnd type="none" w="med" len="med"/>
+                    </a:lnR>
+                  </a:tcPr>
+                </a:tc>
+                <a:tc gridSpan="2">
+                  <a:txBody>
+                    <a:bodyPr/>
+                    <a:lstStyle/>
+                    <a:p>
+                      <a:pPr marL="0" marR="0" indent="0" algn="ctr" defTabSz="914400" rtl="0" eaLnBrk="1" fontAlgn="auto" latinLnBrk="1" hangingPunct="1">
+                        <a:lnSpc>
+                          <a:spcPct val="100000"/>
+                        </a:lnSpc>
+                        <a:spcBef>
+                          <a:spcPts val="0"/>
+                        </a:spcBef>
+                        <a:spcAft>
+                          <a:spcPts val="0"/>
+                        </a:spcAft>
+                        <a:buClrTx/>
+                        <a:buSzTx/>
+                        <a:buFontTx/>
+                        <a:buNone/>
+                        <a:tabLst/>
+                        <a:defRPr/>
+                      </a:pPr>
+                      <a:r>
+                        <a:rPr lang="en-US" altLang="ko-KR" dirty="0" smtClean="0"/>
+                        <a:t>CHAR(1)</a:t>
+                      </a:r>
+                      <a:endParaRPr lang="ko-KR" altLang="en-US" dirty="0" smtClean="0"/>
+                    </a:p>
+                  </a:txBody>
+                  <a:tcPr>
+                    <a:lnL w="12700" cap="flat" cmpd="sng" algn="ctr">
+                      <a:solidFill>
+                        <a:schemeClr val="accent3">
+                          <a:lumMod val="60000"/>
+                          <a:lumOff val="40000"/>
+                        </a:schemeClr>
+                      </a:solidFill>
+                      <a:prstDash val="solid"/>
+                      <a:round/>
+                      <a:headEnd type="none" w="med" len="med"/>
+                      <a:tailEnd type="none" w="med" len="med"/>
+                    </a:lnL>
+                    <a:lnR w="12700" cap="flat" cmpd="sng" algn="ctr">
+                      <a:solidFill>
+                        <a:schemeClr val="accent3">
+                          <a:lumMod val="60000"/>
+                          <a:lumOff val="40000"/>
+                        </a:schemeClr>
+                      </a:solidFill>
+                      <a:prstDash val="solid"/>
+                      <a:round/>
+                      <a:headEnd type="none" w="med" len="med"/>
+                      <a:tailEnd type="none" w="med" len="med"/>
+                    </a:lnR>
+                  </a:tcPr>
+                </a:tc>
+                <a:tc hMerge="1">
+                  <a:txBody>
+                    <a:bodyPr/>
+                    <a:lstStyle/>
+                    <a:p>
+                      <a:pPr latinLnBrk="1"/>
+                      <a:endParaRPr lang="ko-KR" altLang="en-US"/>
+                    </a:p>
+                  </a:txBody>
+                  <a:tcPr/>
+                </a:tc>
+                <a:tc>
+                  <a:txBody>
+                    <a:bodyPr/>
+                    <a:lstStyle/>
+                    <a:p>
+                      <a:pPr marL="0" marR="0" indent="0" algn="ctr" defTabSz="914400" rtl="0" eaLnBrk="1" fontAlgn="auto" latinLnBrk="1" hangingPunct="1">
+                        <a:lnSpc>
+                          <a:spcPct val="100000"/>
+                        </a:lnSpc>
+                        <a:spcBef>
+                          <a:spcPts val="0"/>
+                        </a:spcBef>
+                        <a:spcAft>
+                          <a:spcPts val="0"/>
+                        </a:spcAft>
+                        <a:buClrTx/>
+                        <a:buSzTx/>
+                        <a:buFontTx/>
+                        <a:buNone/>
+                        <a:tabLst/>
+                        <a:defRPr/>
+                      </a:pPr>
+                      <a:r>
+                        <a:rPr lang="en-US" altLang="ko-KR" dirty="0" smtClean="0"/>
+                        <a:t>NOT NULL</a:t>
+                      </a:r>
+                      <a:endParaRPr lang="ko-KR" altLang="en-US" dirty="0" smtClean="0"/>
+                    </a:p>
+                  </a:txBody>
+                  <a:tcPr>
+                    <a:lnL w="12700" cap="flat" cmpd="sng" algn="ctr">
+                      <a:solidFill>
+                        <a:schemeClr val="accent3">
+                          <a:lumMod val="60000"/>
+                          <a:lumOff val="40000"/>
+                        </a:schemeClr>
+                      </a:solidFill>
+                      <a:prstDash val="solid"/>
+                      <a:round/>
+                      <a:headEnd type="none" w="med" len="med"/>
+                      <a:tailEnd type="none" w="med" len="med"/>
+                    </a:lnL>
+                  </a:tcPr>
+                </a:tc>
+                <a:extLst>
+                  <a:ext uri="{0D108BD9-81ED-4DB2-BD59-A6C34878D82A}">
+                    <a16:rowId xmlns:a16="http://schemas.microsoft.com/office/drawing/2014/main" val="192837359"/>
+                  </a:ext>
+                </a:extLst>
+              </a:tr>
+            </a:tbl>
+          </a:graphicData>
+        </a:graphic>
+      </p:graphicFrame>
     </p:spTree>
     <p:extLst>
       <p:ext uri="{BB962C8B-B14F-4D97-AF65-F5344CB8AC3E}">

</xml_diff>

<commit_message>
Modify ParkingArea Database Specification
</commit_message>
<xml_diff>
--- a/SimpleProjects/Module/ParkingArea/1.Design/Database/Database_ERDiagram.pptx
+++ b/SimpleProjects/Module/ParkingArea/1.Design/Database/Database_ERDiagram.pptx
@@ -305,7 +305,7 @@
           <a:p>
             <a:fld id="{E90ED720-0104-4369-84BC-D37694168613}" type="datetimeFigureOut">
               <a:rPr kumimoji="1" lang="ja-JP" altLang="en-US" smtClean="0"/>
-              <a:t>2020/5/5</a:t>
+              <a:t>2020/5/6</a:t>
             </a:fld>
             <a:endParaRPr kumimoji="1" lang="ja-JP" altLang="en-US"/>
           </a:p>
@@ -502,7 +502,7 @@
           <a:p>
             <a:fld id="{E90ED720-0104-4369-84BC-D37694168613}" type="datetimeFigureOut">
               <a:rPr kumimoji="1" lang="ja-JP" altLang="en-US" smtClean="0"/>
-              <a:t>2020/5/5</a:t>
+              <a:t>2020/5/6</a:t>
             </a:fld>
             <a:endParaRPr kumimoji="1" lang="ja-JP" altLang="en-US"/>
           </a:p>
@@ -709,7 +709,7 @@
           <a:p>
             <a:fld id="{E90ED720-0104-4369-84BC-D37694168613}" type="datetimeFigureOut">
               <a:rPr kumimoji="1" lang="ja-JP" altLang="en-US" smtClean="0"/>
-              <a:t>2020/5/5</a:t>
+              <a:t>2020/5/6</a:t>
             </a:fld>
             <a:endParaRPr kumimoji="1" lang="ja-JP" altLang="en-US"/>
           </a:p>
@@ -906,7 +906,7 @@
           <a:p>
             <a:fld id="{E90ED720-0104-4369-84BC-D37694168613}" type="datetimeFigureOut">
               <a:rPr kumimoji="1" lang="ja-JP" altLang="en-US" smtClean="0"/>
-              <a:t>2020/5/5</a:t>
+              <a:t>2020/5/6</a:t>
             </a:fld>
             <a:endParaRPr kumimoji="1" lang="ja-JP" altLang="en-US"/>
           </a:p>
@@ -1147,7 +1147,7 @@
           <a:p>
             <a:fld id="{E90ED720-0104-4369-84BC-D37694168613}" type="datetimeFigureOut">
               <a:rPr kumimoji="1" lang="ja-JP" altLang="en-US" smtClean="0"/>
-              <a:t>2020/5/5</a:t>
+              <a:t>2020/5/6</a:t>
             </a:fld>
             <a:endParaRPr kumimoji="1" lang="ja-JP" altLang="en-US"/>
           </a:p>
@@ -1494,7 +1494,7 @@
           <a:p>
             <a:fld id="{E90ED720-0104-4369-84BC-D37694168613}" type="datetimeFigureOut">
               <a:rPr kumimoji="1" lang="ja-JP" altLang="en-US" smtClean="0"/>
-              <a:t>2020/5/5</a:t>
+              <a:t>2020/5/6</a:t>
             </a:fld>
             <a:endParaRPr kumimoji="1" lang="ja-JP" altLang="en-US"/>
           </a:p>
@@ -1975,7 +1975,7 @@
           <a:p>
             <a:fld id="{E90ED720-0104-4369-84BC-D37694168613}" type="datetimeFigureOut">
               <a:rPr kumimoji="1" lang="ja-JP" altLang="en-US" smtClean="0"/>
-              <a:t>2020/5/5</a:t>
+              <a:t>2020/5/6</a:t>
             </a:fld>
             <a:endParaRPr kumimoji="1" lang="ja-JP" altLang="en-US"/>
           </a:p>
@@ -2088,7 +2088,7 @@
           <a:p>
             <a:fld id="{E90ED720-0104-4369-84BC-D37694168613}" type="datetimeFigureOut">
               <a:rPr kumimoji="1" lang="ja-JP" altLang="en-US" smtClean="0"/>
-              <a:t>2020/5/5</a:t>
+              <a:t>2020/5/6</a:t>
             </a:fld>
             <a:endParaRPr kumimoji="1" lang="ja-JP" altLang="en-US"/>
           </a:p>
@@ -2178,7 +2178,7 @@
           <a:p>
             <a:fld id="{E90ED720-0104-4369-84BC-D37694168613}" type="datetimeFigureOut">
               <a:rPr kumimoji="1" lang="ja-JP" altLang="en-US" smtClean="0"/>
-              <a:t>2020/5/5</a:t>
+              <a:t>2020/5/6</a:t>
             </a:fld>
             <a:endParaRPr kumimoji="1" lang="ja-JP" altLang="en-US"/>
           </a:p>
@@ -2482,7 +2482,7 @@
           <a:p>
             <a:fld id="{E90ED720-0104-4369-84BC-D37694168613}" type="datetimeFigureOut">
               <a:rPr kumimoji="1" lang="ja-JP" altLang="en-US" smtClean="0"/>
-              <a:t>2020/5/5</a:t>
+              <a:t>2020/5/6</a:t>
             </a:fld>
             <a:endParaRPr kumimoji="1" lang="ja-JP" altLang="en-US"/>
           </a:p>
@@ -2730,7 +2730,7 @@
           <a:p>
             <a:fld id="{E90ED720-0104-4369-84BC-D37694168613}" type="datetimeFigureOut">
               <a:rPr kumimoji="1" lang="ja-JP" altLang="en-US" smtClean="0"/>
-              <a:t>2020/5/5</a:t>
+              <a:t>2020/5/6</a:t>
             </a:fld>
             <a:endParaRPr kumimoji="1" lang="ja-JP" altLang="en-US"/>
           </a:p>
@@ -2970,7 +2970,7 @@
           <a:p>
             <a:fld id="{E90ED720-0104-4369-84BC-D37694168613}" type="datetimeFigureOut">
               <a:rPr kumimoji="1" lang="ja-JP" altLang="en-US" smtClean="0"/>
-              <a:t>2020/5/5</a:t>
+              <a:t>2020/5/6</a:t>
             </a:fld>
             <a:endParaRPr kumimoji="1" lang="ja-JP" altLang="en-US"/>
           </a:p>
@@ -3349,7 +3349,7 @@
           <p:nvPr>
             <p:extLst>
               <p:ext uri="{D42A27DB-BD31-4B8C-83A1-F6EECF244321}">
-                <p14:modId xmlns:p14="http://schemas.microsoft.com/office/powerpoint/2010/main" val="3972229413"/>
+                <p14:modId xmlns:p14="http://schemas.microsoft.com/office/powerpoint/2010/main" val="547110145"/>
               </p:ext>
             </p:extLst>
           </p:nvPr>
@@ -3621,7 +3621,7 @@
                     <a:bodyPr/>
                     <a:lstStyle/>
                     <a:p>
-                      <a:pPr algn="ctr" latinLnBrk="1"/>
+                      <a:pPr algn="l" latinLnBrk="1"/>
                       <a:r>
                         <a:rPr lang="en-US" altLang="ko-KR" dirty="0" smtClean="0"/>
                         <a:t>LOT_NUMBER</a:t>
@@ -3703,8 +3703,9 @@
                       <a:pPr algn="ctr" latinLnBrk="1"/>
                       <a:r>
                         <a:rPr lang="en-US" altLang="ko-KR" baseline="0" dirty="0" smtClean="0"/>
-                        <a:t>Primary key</a:t>
+                        <a:t>PRIMARY KEY</a:t>
                       </a:r>
+                      <a:endParaRPr lang="en-US" altLang="ko-KR" baseline="0" dirty="0" smtClean="0"/>
                     </a:p>
                   </a:txBody>
                   <a:tcPr>
@@ -3734,7 +3735,7 @@
                     <a:bodyPr/>
                     <a:lstStyle/>
                     <a:p>
-                      <a:pPr algn="ctr" latinLnBrk="1"/>
+                      <a:pPr algn="l" latinLnBrk="1"/>
                       <a:r>
                         <a:rPr lang="en-US" altLang="ko-KR" dirty="0" smtClean="0"/>
                         <a:t>LOT_NAME</a:t>
@@ -3852,7 +3853,7 @@
                     <a:bodyPr/>
                     <a:lstStyle/>
                     <a:p>
-                      <a:pPr algn="ctr" latinLnBrk="1"/>
+                      <a:pPr algn="l" latinLnBrk="1"/>
                       <a:r>
                         <a:rPr lang="en-US" altLang="ko-KR" dirty="0" smtClean="0"/>
                         <a:t>ACCEPTABLE_SMALL</a:t>
@@ -3986,7 +3987,7 @@
                     <a:bodyPr/>
                     <a:lstStyle/>
                     <a:p>
-                      <a:pPr algn="ctr" latinLnBrk="1"/>
+                      <a:pPr algn="l" latinLnBrk="1"/>
                       <a:r>
                         <a:rPr lang="en-US" altLang="ko-KR" dirty="0" smtClean="0"/>
                         <a:t>ACCEPTABLE_MEDIUM</a:t>
@@ -4120,7 +4121,7 @@
                     <a:bodyPr/>
                     <a:lstStyle/>
                     <a:p>
-                      <a:pPr algn="ctr" latinLnBrk="1"/>
+                      <a:pPr algn="l" latinLnBrk="1"/>
                       <a:r>
                         <a:rPr lang="en-US" altLang="ko-KR" dirty="0" smtClean="0"/>
                         <a:t>ACCEPTABLE_HEAVY</a:t>
@@ -4254,7 +4255,7 @@
                     <a:bodyPr/>
                     <a:lstStyle/>
                     <a:p>
-                      <a:pPr algn="ctr" latinLnBrk="1"/>
+                      <a:pPr algn="l" latinLnBrk="1"/>
                       <a:r>
                         <a:rPr lang="en-US" altLang="ko-KR" dirty="0" smtClean="0"/>
                         <a:t>DEL_FLG</a:t>
@@ -5513,7 +5514,7 @@
           <p:nvPr>
             <p:extLst>
               <p:ext uri="{D42A27DB-BD31-4B8C-83A1-F6EECF244321}">
-                <p14:modId xmlns:p14="http://schemas.microsoft.com/office/powerpoint/2010/main" val="686568572"/>
+                <p14:modId xmlns:p14="http://schemas.microsoft.com/office/powerpoint/2010/main" val="2550545233"/>
               </p:ext>
             </p:extLst>
           </p:nvPr>
@@ -5785,7 +5786,7 @@
                     <a:bodyPr/>
                     <a:lstStyle/>
                     <a:p>
-                      <a:pPr algn="ctr" latinLnBrk="1"/>
+                      <a:pPr algn="l" latinLnBrk="1"/>
                       <a:r>
                         <a:rPr lang="en-US" altLang="ko-KR" dirty="0" smtClean="0"/>
                         <a:t>VEHICLE_NUMBER</a:t>
@@ -5867,8 +5868,9 @@
                       <a:pPr algn="ctr" latinLnBrk="1"/>
                       <a:r>
                         <a:rPr lang="en-US" altLang="ko-KR" baseline="0" dirty="0" smtClean="0"/>
-                        <a:t>Primary key</a:t>
+                        <a:t>PRIMARY KEY</a:t>
                       </a:r>
+                      <a:endParaRPr lang="en-US" altLang="ko-KR" baseline="0" dirty="0" smtClean="0"/>
                     </a:p>
                   </a:txBody>
                   <a:tcPr>
@@ -5898,7 +5900,7 @@
                     <a:bodyPr/>
                     <a:lstStyle/>
                     <a:p>
-                      <a:pPr algn="ctr" latinLnBrk="1"/>
+                      <a:pPr algn="l" latinLnBrk="1"/>
                       <a:r>
                         <a:rPr lang="en-US" altLang="ko-KR" dirty="0" smtClean="0"/>
                         <a:t>CLIENT_NUMBER</a:t>
@@ -6016,7 +6018,7 @@
                     <a:bodyPr/>
                     <a:lstStyle/>
                     <a:p>
-                      <a:pPr algn="ctr" latinLnBrk="1"/>
+                      <a:pPr algn="l" latinLnBrk="1"/>
                       <a:r>
                         <a:rPr lang="en-US" altLang="ko-KR" dirty="0" smtClean="0"/>
                         <a:t>ARRIVAL_TIME</a:t>
@@ -6150,7 +6152,7 @@
                     <a:bodyPr/>
                     <a:lstStyle/>
                     <a:p>
-                      <a:pPr algn="ctr" latinLnBrk="1"/>
+                      <a:pPr algn="l" latinLnBrk="1"/>
                       <a:r>
                         <a:rPr lang="en-US" altLang="ko-KR" dirty="0" smtClean="0"/>
                         <a:t>DEPARTURE_TIME</a:t>
@@ -6296,7 +6298,7 @@
                     <a:bodyPr/>
                     <a:lstStyle/>
                     <a:p>
-                      <a:pPr algn="ctr" latinLnBrk="1"/>
+                      <a:pPr algn="l" latinLnBrk="1"/>
                       <a:r>
                         <a:rPr lang="en-US" altLang="ko-KR" dirty="0" smtClean="0"/>
                         <a:t>HOURS_OF_USE</a:t>
@@ -6442,7 +6444,7 @@
                     <a:bodyPr/>
                     <a:lstStyle/>
                     <a:p>
-                      <a:pPr algn="ctr" latinLnBrk="1"/>
+                      <a:pPr algn="l" latinLnBrk="1"/>
                       <a:r>
                         <a:rPr lang="en-US" altLang="ko-KR" dirty="0" smtClean="0"/>
                         <a:t>COST_OF_USE</a:t>
@@ -6588,7 +6590,7 @@
                     <a:bodyPr/>
                     <a:lstStyle/>
                     <a:p>
-                      <a:pPr algn="ctr" latinLnBrk="1"/>
+                      <a:pPr algn="l" latinLnBrk="1"/>
                       <a:r>
                         <a:rPr lang="en-US" altLang="ko-KR" dirty="0" smtClean="0"/>
                         <a:t>END_BISUNESS_FLG</a:t>

</xml_diff>

<commit_message>
Update ParkingArea Database Specification
</commit_message>
<xml_diff>
--- a/SimpleProjects/Module/ParkingArea/1.Design/Database/Database_ERDiagram.pptx
+++ b/SimpleProjects/Module/ParkingArea/1.Design/Database/Database_ERDiagram.pptx
@@ -3349,7 +3349,7 @@
           <p:nvPr>
             <p:extLst>
               <p:ext uri="{D42A27DB-BD31-4B8C-83A1-F6EECF244321}">
-                <p14:modId xmlns:p14="http://schemas.microsoft.com/office/powerpoint/2010/main" val="547110145"/>
+                <p14:modId xmlns:p14="http://schemas.microsoft.com/office/powerpoint/2010/main" val="3800749324"/>
               </p:ext>
             </p:extLst>
           </p:nvPr>
@@ -3442,7 +3442,7 @@
                       <a:pPr algn="ctr" latinLnBrk="1"/>
                       <a:r>
                         <a:rPr lang="en-US" altLang="ko-KR" dirty="0" smtClean="0"/>
-                        <a:t>T_LOT_INFORMATION</a:t>
+                        <a:t>LOT_INFORMATION</a:t>
                       </a:r>
                       <a:endParaRPr lang="ko-KR" altLang="en-US" dirty="0"/>
                     </a:p>
@@ -3652,7 +3652,7 @@
                       <a:pPr algn="ctr" latinLnBrk="1"/>
                       <a:r>
                         <a:rPr lang="en-US" altLang="ko-KR" dirty="0" smtClean="0"/>
-                        <a:t>VARCHAR(20)</a:t>
+                        <a:t>NUMBER</a:t>
                       </a:r>
                       <a:endParaRPr lang="ko-KR" altLang="en-US" dirty="0"/>
                     </a:p>
@@ -3705,7 +3705,6 @@
                         <a:rPr lang="en-US" altLang="ko-KR" baseline="0" dirty="0" smtClean="0"/>
                         <a:t>PRIMARY KEY</a:t>
                       </a:r>
-                      <a:endParaRPr lang="en-US" altLang="ko-KR" baseline="0" dirty="0" smtClean="0"/>
                     </a:p>
                   </a:txBody>
                   <a:tcPr>
@@ -5514,7 +5513,7 @@
           <p:nvPr>
             <p:extLst>
               <p:ext uri="{D42A27DB-BD31-4B8C-83A1-F6EECF244321}">
-                <p14:modId xmlns:p14="http://schemas.microsoft.com/office/powerpoint/2010/main" val="2550545233"/>
+                <p14:modId xmlns:p14="http://schemas.microsoft.com/office/powerpoint/2010/main" val="964998373"/>
               </p:ext>
             </p:extLst>
           </p:nvPr>
@@ -5607,7 +5606,7 @@
                       <a:pPr algn="ctr" latinLnBrk="1"/>
                       <a:r>
                         <a:rPr lang="en-US" altLang="ko-KR" dirty="0" smtClean="0"/>
-                        <a:t>T_ENTRY_BOOK</a:t>
+                        <a:t>ENTRY_BOOK</a:t>
                       </a:r>
                       <a:endParaRPr lang="ko-KR" altLang="en-US" dirty="0"/>
                     </a:p>
@@ -5870,7 +5869,6 @@
                         <a:rPr lang="en-US" altLang="ko-KR" baseline="0" dirty="0" smtClean="0"/>
                         <a:t>PRIMARY KEY</a:t>
                       </a:r>
-                      <a:endParaRPr lang="en-US" altLang="ko-KR" baseline="0" dirty="0" smtClean="0"/>
                     </a:p>
                   </a:txBody>
                   <a:tcPr>

</xml_diff>